<commit_message>
added note about optunity code
</commit_message>
<xml_diff>
--- a/Slides for Video.pptx
+++ b/Slides for Video.pptx
@@ -116,6 +116,11 @@
       </a:defRPr>
     </a:lvl9pPr>
   </p:defaultTextStyle>
+  <p:extLst>
+    <p:ext uri="{EFAFB233-063F-42B5-8137-9DF3F51BA10A}">
+      <p15:sldGuideLst xmlns:p15="http://schemas.microsoft.com/office/powerpoint/2012/main"/>
+    </p:ext>
+  </p:extLst>
 </p:presentation>
 </file>
 
@@ -250,7 +255,7 @@
           <a:p>
             <a:fld id="{70F2A619-5505-4B17-BF76-63909794FD4A}" type="datetimeFigureOut">
               <a:rPr lang="en-US" smtClean="0"/>
-              <a:t>4/15/2018</a:t>
+              <a:t>4/16/2018</a:t>
             </a:fld>
             <a:endParaRPr lang="en-US" dirty="0"/>
           </a:p>
@@ -420,7 +425,7 @@
           <a:p>
             <a:fld id="{70F2A619-5505-4B17-BF76-63909794FD4A}" type="datetimeFigureOut">
               <a:rPr lang="en-US" smtClean="0"/>
-              <a:t>4/15/2018</a:t>
+              <a:t>4/16/2018</a:t>
             </a:fld>
             <a:endParaRPr lang="en-US" dirty="0"/>
           </a:p>
@@ -600,7 +605,7 @@
           <a:p>
             <a:fld id="{70F2A619-5505-4B17-BF76-63909794FD4A}" type="datetimeFigureOut">
               <a:rPr lang="en-US" smtClean="0"/>
-              <a:t>4/15/2018</a:t>
+              <a:t>4/16/2018</a:t>
             </a:fld>
             <a:endParaRPr lang="en-US" dirty="0"/>
           </a:p>
@@ -770,7 +775,7 @@
           <a:p>
             <a:fld id="{70F2A619-5505-4B17-BF76-63909794FD4A}" type="datetimeFigureOut">
               <a:rPr lang="en-US" smtClean="0"/>
-              <a:t>4/15/2018</a:t>
+              <a:t>4/16/2018</a:t>
             </a:fld>
             <a:endParaRPr lang="en-US" dirty="0"/>
           </a:p>
@@ -1016,7 +1021,7 @@
           <a:p>
             <a:fld id="{70F2A619-5505-4B17-BF76-63909794FD4A}" type="datetimeFigureOut">
               <a:rPr lang="en-US" smtClean="0"/>
-              <a:t>4/15/2018</a:t>
+              <a:t>4/16/2018</a:t>
             </a:fld>
             <a:endParaRPr lang="en-US" dirty="0"/>
           </a:p>
@@ -1248,7 +1253,7 @@
           <a:p>
             <a:fld id="{70F2A619-5505-4B17-BF76-63909794FD4A}" type="datetimeFigureOut">
               <a:rPr lang="en-US" smtClean="0"/>
-              <a:t>4/15/2018</a:t>
+              <a:t>4/16/2018</a:t>
             </a:fld>
             <a:endParaRPr lang="en-US" dirty="0"/>
           </a:p>
@@ -1615,7 +1620,7 @@
           <a:p>
             <a:fld id="{70F2A619-5505-4B17-BF76-63909794FD4A}" type="datetimeFigureOut">
               <a:rPr lang="en-US" smtClean="0"/>
-              <a:t>4/15/2018</a:t>
+              <a:t>4/16/2018</a:t>
             </a:fld>
             <a:endParaRPr lang="en-US" dirty="0"/>
           </a:p>
@@ -1733,7 +1738,7 @@
           <a:p>
             <a:fld id="{70F2A619-5505-4B17-BF76-63909794FD4A}" type="datetimeFigureOut">
               <a:rPr lang="en-US" smtClean="0"/>
-              <a:t>4/15/2018</a:t>
+              <a:t>4/16/2018</a:t>
             </a:fld>
             <a:endParaRPr lang="en-US" dirty="0"/>
           </a:p>
@@ -1828,7 +1833,7 @@
           <a:p>
             <a:fld id="{70F2A619-5505-4B17-BF76-63909794FD4A}" type="datetimeFigureOut">
               <a:rPr lang="en-US" smtClean="0"/>
-              <a:t>4/15/2018</a:t>
+              <a:t>4/16/2018</a:t>
             </a:fld>
             <a:endParaRPr lang="en-US" dirty="0"/>
           </a:p>
@@ -2105,7 +2110,7 @@
           <a:p>
             <a:fld id="{70F2A619-5505-4B17-BF76-63909794FD4A}" type="datetimeFigureOut">
               <a:rPr lang="en-US" smtClean="0"/>
-              <a:t>4/15/2018</a:t>
+              <a:t>4/16/2018</a:t>
             </a:fld>
             <a:endParaRPr lang="en-US" dirty="0"/>
           </a:p>
@@ -2358,7 +2363,7 @@
           <a:p>
             <a:fld id="{70F2A619-5505-4B17-BF76-63909794FD4A}" type="datetimeFigureOut">
               <a:rPr lang="en-US" smtClean="0"/>
-              <a:t>4/15/2018</a:t>
+              <a:t>4/16/2018</a:t>
             </a:fld>
             <a:endParaRPr lang="en-US" dirty="0"/>
           </a:p>
@@ -2576,7 +2581,7 @@
           <a:p>
             <a:fld id="{70F2A619-5505-4B17-BF76-63909794FD4A}" type="datetimeFigureOut">
               <a:rPr lang="en-US" smtClean="0"/>
-              <a:t>4/15/2018</a:t>
+              <a:t>4/16/2018</a:t>
             </a:fld>
             <a:endParaRPr lang="en-US" dirty="0"/>
           </a:p>
@@ -3066,16 +3071,32 @@
             <a:r>
               <a:rPr lang="en-US" sz="3200" dirty="0" smtClean="0">
                 <a:solidFill>
+                  <a:srgbClr val="FFFF00"/>
+                </a:solidFill>
+              </a:rPr>
+              <a:t>A</a:t>
+            </a:r>
+            <a:r>
+              <a:rPr lang="en-US" sz="3200" dirty="0" smtClean="0">
+                <a:solidFill>
                   <a:schemeClr val="accent1">
                     <a:lumMod val="75000"/>
                   </a:schemeClr>
                 </a:solidFill>
               </a:rPr>
-              <a:t>A + B + C = 100</a:t>
+              <a:t> + B + C = 100</a:t>
             </a:r>
           </a:p>
           <a:p>
             <a:pPr algn="ctr"/>
+            <a:r>
+              <a:rPr lang="en-US" sz="3200" dirty="0" smtClean="0">
+                <a:solidFill>
+                  <a:srgbClr val="FFFF00"/>
+                </a:solidFill>
+              </a:rPr>
+              <a:t>A</a:t>
+            </a:r>
             <a:r>
               <a:rPr lang="en-US" sz="3200" dirty="0" smtClean="0">
                 <a:solidFill>
@@ -3084,7 +3105,7 @@
                   </a:schemeClr>
                 </a:solidFill>
               </a:rPr>
-              <a:t>A + C + D = 130</a:t>
+              <a:t> + C + D = 130</a:t>
             </a:r>
           </a:p>
           <a:p>
@@ -3105,12 +3126,20 @@
             <a:r>
               <a:rPr lang="en-US" sz="3200" dirty="0" smtClean="0">
                 <a:solidFill>
+                  <a:srgbClr val="FFFF00"/>
+                </a:solidFill>
+              </a:rPr>
+              <a:t>A</a:t>
+            </a:r>
+            <a:r>
+              <a:rPr lang="en-US" sz="3200" dirty="0" smtClean="0">
+                <a:solidFill>
                   <a:schemeClr val="accent1">
                     <a:lumMod val="75000"/>
                   </a:schemeClr>
                 </a:solidFill>
               </a:rPr>
-              <a:t>A + B + D = 150</a:t>
+              <a:t> + B + D = 150</a:t>
             </a:r>
           </a:p>
           <a:p>
@@ -3206,16 +3235,32 @@
             <a:r>
               <a:rPr lang="en-US" sz="3200" dirty="0" smtClean="0">
                 <a:solidFill>
+                  <a:srgbClr val="FFFF00"/>
+                </a:solidFill>
+              </a:rPr>
+              <a:t>A</a:t>
+            </a:r>
+            <a:r>
+              <a:rPr lang="en-US" sz="3200" dirty="0" smtClean="0">
+                <a:solidFill>
                   <a:schemeClr val="accent1">
                     <a:lumMod val="75000"/>
                   </a:schemeClr>
                 </a:solidFill>
               </a:rPr>
-              <a:t>A + B + C = 100</a:t>
+              <a:t> + B + C = 100</a:t>
             </a:r>
           </a:p>
           <a:p>
             <a:pPr algn="ctr"/>
+            <a:r>
+              <a:rPr lang="en-US" sz="3200" dirty="0" smtClean="0">
+                <a:solidFill>
+                  <a:srgbClr val="FFFF00"/>
+                </a:solidFill>
+              </a:rPr>
+              <a:t>A</a:t>
+            </a:r>
             <a:r>
               <a:rPr lang="en-US" sz="3200" dirty="0" smtClean="0">
                 <a:solidFill>
@@ -3224,11 +3269,19 @@
                   </a:schemeClr>
                 </a:solidFill>
               </a:rPr>
-              <a:t>A + C + D = 130</a:t>
+              <a:t> + C + D = 130</a:t>
             </a:r>
           </a:p>
           <a:p>
             <a:pPr algn="ctr"/>
+            <a:r>
+              <a:rPr lang="en-US" sz="3200" dirty="0" smtClean="0">
+                <a:solidFill>
+                  <a:srgbClr val="FFFF00"/>
+                </a:solidFill>
+              </a:rPr>
+              <a:t>A</a:t>
+            </a:r>
             <a:r>
               <a:rPr lang="en-US" sz="3200" dirty="0" smtClean="0">
                 <a:solidFill>
@@ -3237,7 +3290,7 @@
                   </a:schemeClr>
                 </a:solidFill>
               </a:rPr>
-              <a:t>A + B + D = 150</a:t>
+              <a:t> + B + D = 150</a:t>
             </a:r>
           </a:p>
           <a:p>
@@ -3260,7 +3313,25 @@
                   </a:schemeClr>
                 </a:solidFill>
               </a:rPr>
-              <a:t>3A + 2B + 2C + 2D = 380</a:t>
+              <a:t>3</a:t>
+            </a:r>
+            <a:r>
+              <a:rPr lang="en-US" sz="3200" dirty="0" smtClean="0">
+                <a:solidFill>
+                  <a:srgbClr val="FFFF00"/>
+                </a:solidFill>
+              </a:rPr>
+              <a:t>A</a:t>
+            </a:r>
+            <a:r>
+              <a:rPr lang="en-US" sz="3200" dirty="0" smtClean="0">
+                <a:solidFill>
+                  <a:schemeClr val="accent1">
+                    <a:lumMod val="75000"/>
+                  </a:schemeClr>
+                </a:solidFill>
+              </a:rPr>
+              <a:t> + 2B + 2C + 2D = 380</a:t>
             </a:r>
           </a:p>
         </p:txBody>

</xml_diff>